<commit_message>
200,000 event runs results
</commit_message>
<xml_diff>
--- a/annie_v02_sphere_argon_gas_*_4_TWATER_100_1000/annie_v02_sphere_argon_gas_*_4_TWATER_100_1000.pptx
+++ b/annie_v02_sphere_argon_gas_*_4_TWATER_100_1000/annie_v02_sphere_argon_gas_*_4_TWATER_100_1000.pptx
@@ -6,8 +6,8 @@
   </p:sldMasterIdLst>
   <p:sldIdLst>
     <p:sldId id="256" r:id="rId2"/>
-    <p:sldId id="257" r:id="rId3"/>
-    <p:sldId id="258" r:id="rId4"/>
+    <p:sldId id="259" r:id="rId3"/>
+    <p:sldId id="260" r:id="rId4"/>
   </p:sldIdLst>
   <p:sldSz cx="12192000" cy="6858000"/>
   <p:notesSz cx="6858000" cy="9144000"/>
@@ -261,7 +261,7 @@
           <a:p>
             <a:fld id="{2F6F8756-9810-6D45-B843-DF7B394751E6}" type="datetimeFigureOut">
               <a:rPr lang="en-US" smtClean="0"/>
-              <a:t>5/20/22</a:t>
+              <a:t>6/3/22</a:t>
             </a:fld>
             <a:endParaRPr lang="en-US"/>
           </a:p>
@@ -459,7 +459,7 @@
           <a:p>
             <a:fld id="{2F6F8756-9810-6D45-B843-DF7B394751E6}" type="datetimeFigureOut">
               <a:rPr lang="en-US" smtClean="0"/>
-              <a:t>5/20/22</a:t>
+              <a:t>6/3/22</a:t>
             </a:fld>
             <a:endParaRPr lang="en-US"/>
           </a:p>
@@ -667,7 +667,7 @@
           <a:p>
             <a:fld id="{2F6F8756-9810-6D45-B843-DF7B394751E6}" type="datetimeFigureOut">
               <a:rPr lang="en-US" smtClean="0"/>
-              <a:t>5/20/22</a:t>
+              <a:t>6/3/22</a:t>
             </a:fld>
             <a:endParaRPr lang="en-US"/>
           </a:p>
@@ -865,7 +865,7 @@
           <a:p>
             <a:fld id="{2F6F8756-9810-6D45-B843-DF7B394751E6}" type="datetimeFigureOut">
               <a:rPr lang="en-US" smtClean="0"/>
-              <a:t>5/20/22</a:t>
+              <a:t>6/3/22</a:t>
             </a:fld>
             <a:endParaRPr lang="en-US"/>
           </a:p>
@@ -1140,7 +1140,7 @@
           <a:p>
             <a:fld id="{2F6F8756-9810-6D45-B843-DF7B394751E6}" type="datetimeFigureOut">
               <a:rPr lang="en-US" smtClean="0"/>
-              <a:t>5/20/22</a:t>
+              <a:t>6/3/22</a:t>
             </a:fld>
             <a:endParaRPr lang="en-US"/>
           </a:p>
@@ -1405,7 +1405,7 @@
           <a:p>
             <a:fld id="{2F6F8756-9810-6D45-B843-DF7B394751E6}" type="datetimeFigureOut">
               <a:rPr lang="en-US" smtClean="0"/>
-              <a:t>5/20/22</a:t>
+              <a:t>6/3/22</a:t>
             </a:fld>
             <a:endParaRPr lang="en-US"/>
           </a:p>
@@ -1817,7 +1817,7 @@
           <a:p>
             <a:fld id="{2F6F8756-9810-6D45-B843-DF7B394751E6}" type="datetimeFigureOut">
               <a:rPr lang="en-US" smtClean="0"/>
-              <a:t>5/20/22</a:t>
+              <a:t>6/3/22</a:t>
             </a:fld>
             <a:endParaRPr lang="en-US"/>
           </a:p>
@@ -1958,7 +1958,7 @@
           <a:p>
             <a:fld id="{2F6F8756-9810-6D45-B843-DF7B394751E6}" type="datetimeFigureOut">
               <a:rPr lang="en-US" smtClean="0"/>
-              <a:t>5/20/22</a:t>
+              <a:t>6/3/22</a:t>
             </a:fld>
             <a:endParaRPr lang="en-US"/>
           </a:p>
@@ -2071,7 +2071,7 @@
           <a:p>
             <a:fld id="{2F6F8756-9810-6D45-B843-DF7B394751E6}" type="datetimeFigureOut">
               <a:rPr lang="en-US" smtClean="0"/>
-              <a:t>5/20/22</a:t>
+              <a:t>6/3/22</a:t>
             </a:fld>
             <a:endParaRPr lang="en-US"/>
           </a:p>
@@ -2382,7 +2382,7 @@
           <a:p>
             <a:fld id="{2F6F8756-9810-6D45-B843-DF7B394751E6}" type="datetimeFigureOut">
               <a:rPr lang="en-US" smtClean="0"/>
-              <a:t>5/20/22</a:t>
+              <a:t>6/3/22</a:t>
             </a:fld>
             <a:endParaRPr lang="en-US"/>
           </a:p>
@@ -2670,7 +2670,7 @@
           <a:p>
             <a:fld id="{2F6F8756-9810-6D45-B843-DF7B394751E6}" type="datetimeFigureOut">
               <a:rPr lang="en-US" smtClean="0"/>
-              <a:t>5/20/22</a:t>
+              <a:t>6/3/22</a:t>
             </a:fld>
             <a:endParaRPr lang="en-US"/>
           </a:p>
@@ -2911,7 +2911,7 @@
           <a:p>
             <a:fld id="{2F6F8756-9810-6D45-B843-DF7B394751E6}" type="datetimeFigureOut">
               <a:rPr lang="en-US" smtClean="0"/>
-              <a:t>5/20/22</a:t>
+              <a:t>6/3/22</a:t>
             </a:fld>
             <a:endParaRPr lang="en-US"/>
           </a:p>
@@ -3375,7 +3375,7 @@
             <a:pPr algn="ctr"/>
             <a:r>
               <a:rPr lang="en-US" sz="3600" dirty="0"/>
-              <a:t>20,000 Events in TWATER_LV</a:t>
+              <a:t>100,000 Events in TWATER_LV with Argon at 1atm</a:t>
             </a:r>
           </a:p>
         </p:txBody>
@@ -3434,10 +3434,10 @@
       </p:sp>
       <p:pic>
         <p:nvPicPr>
-          <p:cNvPr id="7" name="Picture 6" descr="Table&#10;&#10;Description automatically generated">
-            <a:extLst>
-              <a:ext uri="{FF2B5EF4-FFF2-40B4-BE49-F238E27FC236}">
-                <a16:creationId xmlns:a16="http://schemas.microsoft.com/office/drawing/2014/main" id="{E15F23AF-6E85-B92B-E358-472B16E3A849}"/>
+          <p:cNvPr id="3" name="Picture 2" descr="Table&#10;&#10;Description automatically generated">
+            <a:extLst>
+              <a:ext uri="{FF2B5EF4-FFF2-40B4-BE49-F238E27FC236}">
+                <a16:creationId xmlns:a16="http://schemas.microsoft.com/office/drawing/2014/main" id="{B2D4B8D3-870C-0C8D-4347-3523575BDAF3}"/>
               </a:ext>
             </a:extLst>
           </p:cNvPr>
@@ -3454,14 +3454,123 @@
         </p:blipFill>
         <p:spPr>
           <a:xfrm>
-            <a:off x="153423" y="679202"/>
-            <a:ext cx="11727640" cy="3547441"/>
+            <a:off x="76200" y="578331"/>
+            <a:ext cx="11604171" cy="6028926"/>
           </a:xfrm>
           <a:prstGeom prst="rect">
             <a:avLst/>
           </a:prstGeom>
         </p:spPr>
       </p:pic>
+      <p:sp>
+        <p:nvSpPr>
+          <p:cNvPr id="8" name="Rectangle 7">
+            <a:extLst>
+              <a:ext uri="{FF2B5EF4-FFF2-40B4-BE49-F238E27FC236}">
+                <a16:creationId xmlns:a16="http://schemas.microsoft.com/office/drawing/2014/main" id="{58F3D6BE-1AE2-AB9E-04C9-C6D53A3CDB6D}"/>
+              </a:ext>
+            </a:extLst>
+          </p:cNvPr>
+          <p:cNvSpPr/>
+          <p:nvPr/>
+        </p:nvSpPr>
+        <p:spPr>
+          <a:xfrm>
+            <a:off x="0" y="6659808"/>
+            <a:ext cx="12192000" cy="198192"/>
+          </a:xfrm>
+          <a:prstGeom prst="rect">
+            <a:avLst/>
+          </a:prstGeom>
+          <a:solidFill>
+            <a:srgbClr val="0C4E97"/>
+          </a:solidFill>
+          <a:ln>
+            <a:noFill/>
+          </a:ln>
+        </p:spPr>
+        <p:style>
+          <a:lnRef idx="2">
+            <a:schemeClr val="accent1">
+              <a:shade val="50000"/>
+            </a:schemeClr>
+          </a:lnRef>
+          <a:fillRef idx="1">
+            <a:schemeClr val="accent1"/>
+          </a:fillRef>
+          <a:effectRef idx="0">
+            <a:schemeClr val="accent1"/>
+          </a:effectRef>
+          <a:fontRef idx="minor">
+            <a:schemeClr val="lt1"/>
+          </a:fontRef>
+        </p:style>
+        <p:txBody>
+          <a:bodyPr rtlCol="0" anchor="ctr"/>
+          <a:lstStyle/>
+          <a:p>
+            <a:pPr algn="r"/>
+            <a:r>
+              <a:rPr lang="en-US" sz="1600" dirty="0"/>
+              <a:t>Noah Everett</a:t>
+            </a:r>
+          </a:p>
+        </p:txBody>
+      </p:sp>
+      <p:sp>
+        <p:nvSpPr>
+          <p:cNvPr id="9" name="Rectangle 8">
+            <a:extLst>
+              <a:ext uri="{FF2B5EF4-FFF2-40B4-BE49-F238E27FC236}">
+                <a16:creationId xmlns:a16="http://schemas.microsoft.com/office/drawing/2014/main" id="{40179CEA-E919-E013-DF12-5E53A3237CC1}"/>
+              </a:ext>
+            </a:extLst>
+          </p:cNvPr>
+          <p:cNvSpPr/>
+          <p:nvPr/>
+        </p:nvSpPr>
+        <p:spPr>
+          <a:xfrm>
+            <a:off x="0" y="6659808"/>
+            <a:ext cx="10078278" cy="198192"/>
+          </a:xfrm>
+          <a:prstGeom prst="rect">
+            <a:avLst/>
+          </a:prstGeom>
+          <a:solidFill>
+            <a:srgbClr val="0C4E97"/>
+          </a:solidFill>
+          <a:ln>
+            <a:noFill/>
+          </a:ln>
+        </p:spPr>
+        <p:style>
+          <a:lnRef idx="2">
+            <a:schemeClr val="accent1">
+              <a:shade val="50000"/>
+            </a:schemeClr>
+          </a:lnRef>
+          <a:fillRef idx="1">
+            <a:schemeClr val="accent1"/>
+          </a:fillRef>
+          <a:effectRef idx="0">
+            <a:schemeClr val="accent1"/>
+          </a:effectRef>
+          <a:fontRef idx="minor">
+            <a:schemeClr val="lt1"/>
+          </a:fontRef>
+        </p:style>
+        <p:txBody>
+          <a:bodyPr rtlCol="0" anchor="ctr"/>
+          <a:lstStyle/>
+          <a:p>
+            <a:r>
+              <a:rPr lang="en-US" sz="1600" dirty="0"/>
+              <a:t>South Dakota Mines</a:t>
+            </a:r>
+          </a:p>
+        </p:txBody>
+      </p:sp>
     </p:spTree>
     <p:extLst>
       <p:ext uri="{BB962C8B-B14F-4D97-AF65-F5344CB8AC3E}">
@@ -3539,7 +3648,7 @@
             <a:pPr algn="ctr"/>
             <a:r>
               <a:rPr lang="en-US" sz="3600" dirty="0"/>
-              <a:t>20,000 Events in TWATER_LV</a:t>
+              <a:t>100,000 Events in TWATER_LV with Argon at 20atm</a:t>
             </a:r>
           </a:p>
         </p:txBody>
@@ -3598,10 +3707,10 @@
       </p:sp>
       <p:pic>
         <p:nvPicPr>
-          <p:cNvPr id="3" name="Picture 2" descr="Chart&#10;&#10;Description automatically generated">
-            <a:extLst>
-              <a:ext uri="{FF2B5EF4-FFF2-40B4-BE49-F238E27FC236}">
-                <a16:creationId xmlns:a16="http://schemas.microsoft.com/office/drawing/2014/main" id="{60626EA6-6D30-454F-A430-4EA8C6A77749}"/>
+          <p:cNvPr id="3" name="Picture 2">
+            <a:extLst>
+              <a:ext uri="{FF2B5EF4-FFF2-40B4-BE49-F238E27FC236}">
+                <a16:creationId xmlns:a16="http://schemas.microsoft.com/office/drawing/2014/main" id="{B2D4B8D3-870C-0C8D-4347-3523575BDAF3}"/>
               </a:ext>
             </a:extLst>
           </p:cNvPr>
@@ -3610,25 +3719,134 @@
           </p:cNvPicPr>
           <p:nvPr/>
         </p:nvPicPr>
-        <p:blipFill rotWithShape="1">
+        <p:blipFill>
           <a:blip r:embed="rId2"/>
-          <a:srcRect t="4026" b="5883"/>
+          <a:srcRect/>
           <a:stretch/>
         </p:blipFill>
         <p:spPr>
           <a:xfrm>
-            <a:off x="0" y="660400"/>
-            <a:ext cx="12192000" cy="5848350"/>
+            <a:off x="76200" y="578331"/>
+            <a:ext cx="11604170" cy="6028926"/>
           </a:xfrm>
           <a:prstGeom prst="rect">
             <a:avLst/>
           </a:prstGeom>
         </p:spPr>
       </p:pic>
+      <p:sp>
+        <p:nvSpPr>
+          <p:cNvPr id="7" name="Rectangle 6">
+            <a:extLst>
+              <a:ext uri="{FF2B5EF4-FFF2-40B4-BE49-F238E27FC236}">
+                <a16:creationId xmlns:a16="http://schemas.microsoft.com/office/drawing/2014/main" id="{7E153DC3-8FB1-8D0C-A382-A2EF1153B3F1}"/>
+              </a:ext>
+            </a:extLst>
+          </p:cNvPr>
+          <p:cNvSpPr/>
+          <p:nvPr/>
+        </p:nvSpPr>
+        <p:spPr>
+          <a:xfrm>
+            <a:off x="0" y="6659808"/>
+            <a:ext cx="12192000" cy="198192"/>
+          </a:xfrm>
+          <a:prstGeom prst="rect">
+            <a:avLst/>
+          </a:prstGeom>
+          <a:solidFill>
+            <a:srgbClr val="0C4E97"/>
+          </a:solidFill>
+          <a:ln>
+            <a:noFill/>
+          </a:ln>
+        </p:spPr>
+        <p:style>
+          <a:lnRef idx="2">
+            <a:schemeClr val="accent1">
+              <a:shade val="50000"/>
+            </a:schemeClr>
+          </a:lnRef>
+          <a:fillRef idx="1">
+            <a:schemeClr val="accent1"/>
+          </a:fillRef>
+          <a:effectRef idx="0">
+            <a:schemeClr val="accent1"/>
+          </a:effectRef>
+          <a:fontRef idx="minor">
+            <a:schemeClr val="lt1"/>
+          </a:fontRef>
+        </p:style>
+        <p:txBody>
+          <a:bodyPr rtlCol="0" anchor="ctr"/>
+          <a:lstStyle/>
+          <a:p>
+            <a:pPr algn="r"/>
+            <a:r>
+              <a:rPr lang="en-US" sz="1600" dirty="0"/>
+              <a:t>Noah Everett</a:t>
+            </a:r>
+          </a:p>
+        </p:txBody>
+      </p:sp>
+      <p:sp>
+        <p:nvSpPr>
+          <p:cNvPr id="8" name="Rectangle 7">
+            <a:extLst>
+              <a:ext uri="{FF2B5EF4-FFF2-40B4-BE49-F238E27FC236}">
+                <a16:creationId xmlns:a16="http://schemas.microsoft.com/office/drawing/2014/main" id="{BA9D25C9-AC91-9408-BE8C-E9EBE0F0010B}"/>
+              </a:ext>
+            </a:extLst>
+          </p:cNvPr>
+          <p:cNvSpPr/>
+          <p:nvPr/>
+        </p:nvSpPr>
+        <p:spPr>
+          <a:xfrm>
+            <a:off x="0" y="6659808"/>
+            <a:ext cx="10078278" cy="198192"/>
+          </a:xfrm>
+          <a:prstGeom prst="rect">
+            <a:avLst/>
+          </a:prstGeom>
+          <a:solidFill>
+            <a:srgbClr val="0C4E97"/>
+          </a:solidFill>
+          <a:ln>
+            <a:noFill/>
+          </a:ln>
+        </p:spPr>
+        <p:style>
+          <a:lnRef idx="2">
+            <a:schemeClr val="accent1">
+              <a:shade val="50000"/>
+            </a:schemeClr>
+          </a:lnRef>
+          <a:fillRef idx="1">
+            <a:schemeClr val="accent1"/>
+          </a:fillRef>
+          <a:effectRef idx="0">
+            <a:schemeClr val="accent1"/>
+          </a:effectRef>
+          <a:fontRef idx="minor">
+            <a:schemeClr val="lt1"/>
+          </a:fontRef>
+        </p:style>
+        <p:txBody>
+          <a:bodyPr rtlCol="0" anchor="ctr"/>
+          <a:lstStyle/>
+          <a:p>
+            <a:r>
+              <a:rPr lang="en-US" sz="1600" dirty="0"/>
+              <a:t>South Dakota Mines</a:t>
+            </a:r>
+          </a:p>
+        </p:txBody>
+      </p:sp>
     </p:spTree>
     <p:extLst>
       <p:ext uri="{BB962C8B-B14F-4D97-AF65-F5344CB8AC3E}">
-        <p14:creationId xmlns:p14="http://schemas.microsoft.com/office/powerpoint/2010/main" val="2972271688"/>
+        <p14:creationId xmlns:p14="http://schemas.microsoft.com/office/powerpoint/2010/main" val="1579348775"/>
       </p:ext>
     </p:extLst>
   </p:cSld>
@@ -3702,7 +3920,7 @@
             <a:pPr algn="ctr"/>
             <a:r>
               <a:rPr lang="en-US" sz="3600" dirty="0"/>
-              <a:t>20,000 Events in TWATER_LV</a:t>
+              <a:t>100,000 Events in TWATER_LV with Argon at 1atm and 20atm</a:t>
             </a:r>
           </a:p>
         </p:txBody>
@@ -3730,6 +3948,9 @@
           <a:solidFill>
             <a:srgbClr val="0C4E97"/>
           </a:solidFill>
+          <a:ln>
+            <a:noFill/>
+          </a:ln>
         </p:spPr>
         <p:style>
           <a:lnRef idx="2">
@@ -3759,39 +3980,435 @@
           </a:p>
         </p:txBody>
       </p:sp>
-      <p:pic>
-        <p:nvPicPr>
-          <p:cNvPr id="7" name="Picture 6" descr="Chart, scatter chart&#10;&#10;Description automatically generated">
-            <a:extLst>
-              <a:ext uri="{FF2B5EF4-FFF2-40B4-BE49-F238E27FC236}">
-                <a16:creationId xmlns:a16="http://schemas.microsoft.com/office/drawing/2014/main" id="{19DB95BC-3CA6-0653-104A-340186510560}"/>
-              </a:ext>
-            </a:extLst>
-          </p:cNvPr>
-          <p:cNvPicPr>
-            <a:picLocks noChangeAspect="1"/>
-          </p:cNvPicPr>
+      <p:grpSp>
+        <p:nvGrpSpPr>
+          <p:cNvPr id="4" name="Group 3">
+            <a:extLst>
+              <a:ext uri="{FF2B5EF4-FFF2-40B4-BE49-F238E27FC236}">
+                <a16:creationId xmlns:a16="http://schemas.microsoft.com/office/drawing/2014/main" id="{71E0E4DA-7B59-3AC1-BAD7-18D949C13BF3}"/>
+              </a:ext>
+            </a:extLst>
+          </p:cNvPr>
+          <p:cNvGrpSpPr/>
           <p:nvPr/>
-        </p:nvPicPr>
-        <p:blipFill rotWithShape="1">
-          <a:blip r:embed="rId2"/>
-          <a:srcRect t="4715" b="1672"/>
-          <a:stretch/>
-        </p:blipFill>
+        </p:nvGrpSpPr>
+        <p:grpSpPr>
+          <a:xfrm>
+            <a:off x="6152322" y="884551"/>
+            <a:ext cx="6019800" cy="3127576"/>
+            <a:chOff x="51652" y="1568931"/>
+            <a:chExt cx="6019800" cy="3127576"/>
+          </a:xfrm>
+        </p:grpSpPr>
+        <p:pic>
+          <p:nvPicPr>
+            <p:cNvPr id="3" name="Picture 2">
+              <a:extLst>
+                <a:ext uri="{FF2B5EF4-FFF2-40B4-BE49-F238E27FC236}">
+                  <a16:creationId xmlns:a16="http://schemas.microsoft.com/office/drawing/2014/main" id="{B2D4B8D3-870C-0C8D-4347-3523575BDAF3}"/>
+                </a:ext>
+              </a:extLst>
+            </p:cNvPr>
+            <p:cNvPicPr>
+              <a:picLocks noChangeAspect="1"/>
+            </p:cNvPicPr>
+            <p:nvPr/>
+          </p:nvPicPr>
+          <p:blipFill>
+            <a:blip r:embed="rId2"/>
+            <a:srcRect/>
+            <a:stretch/>
+          </p:blipFill>
+          <p:spPr>
+            <a:xfrm>
+              <a:off x="51652" y="1568931"/>
+              <a:ext cx="6019800" cy="3127576"/>
+            </a:xfrm>
+            <a:prstGeom prst="rect">
+              <a:avLst/>
+            </a:prstGeom>
+          </p:spPr>
+        </p:pic>
+        <p:sp>
+          <p:nvSpPr>
+            <p:cNvPr id="2" name="Rectangle 1">
+              <a:extLst>
+                <a:ext uri="{FF2B5EF4-FFF2-40B4-BE49-F238E27FC236}">
+                  <a16:creationId xmlns:a16="http://schemas.microsoft.com/office/drawing/2014/main" id="{0EEE19EA-7750-618D-FE88-01CD43DEB8FD}"/>
+                </a:ext>
+              </a:extLst>
+            </p:cNvPr>
+            <p:cNvSpPr/>
+            <p:nvPr/>
+          </p:nvSpPr>
+          <p:spPr>
+            <a:xfrm>
+              <a:off x="1727047" y="3873680"/>
+              <a:ext cx="4273061" cy="122738"/>
+            </a:xfrm>
+            <a:prstGeom prst="rect">
+              <a:avLst/>
+            </a:prstGeom>
+            <a:solidFill>
+              <a:srgbClr val="FFFF00">
+                <a:alpha val="34710"/>
+              </a:srgbClr>
+            </a:solidFill>
+            <a:ln>
+              <a:noFill/>
+            </a:ln>
+          </p:spPr>
+          <p:style>
+            <a:lnRef idx="2">
+              <a:schemeClr val="accent1">
+                <a:shade val="50000"/>
+              </a:schemeClr>
+            </a:lnRef>
+            <a:fillRef idx="1">
+              <a:schemeClr val="accent1"/>
+            </a:fillRef>
+            <a:effectRef idx="0">
+              <a:schemeClr val="accent1"/>
+            </a:effectRef>
+            <a:fontRef idx="minor">
+              <a:schemeClr val="lt1"/>
+            </a:fontRef>
+          </p:style>
+          <p:txBody>
+            <a:bodyPr rtlCol="0" anchor="ctr"/>
+            <a:lstStyle/>
+            <a:p>
+              <a:pPr algn="ctr"/>
+              <a:endParaRPr lang="en-US" dirty="0"/>
+            </a:p>
+          </p:txBody>
+        </p:sp>
+      </p:grpSp>
+      <p:grpSp>
+        <p:nvGrpSpPr>
+          <p:cNvPr id="10" name="Group 9">
+            <a:extLst>
+              <a:ext uri="{FF2B5EF4-FFF2-40B4-BE49-F238E27FC236}">
+                <a16:creationId xmlns:a16="http://schemas.microsoft.com/office/drawing/2014/main" id="{B5EAA287-D2C1-A5B8-BF11-14709312B10D}"/>
+              </a:ext>
+            </a:extLst>
+          </p:cNvPr>
+          <p:cNvGrpSpPr/>
+          <p:nvPr/>
+        </p:nvGrpSpPr>
+        <p:grpSpPr>
+          <a:xfrm>
+            <a:off x="76200" y="884551"/>
+            <a:ext cx="6019800" cy="3127576"/>
+            <a:chOff x="6140428" y="1568932"/>
+            <a:chExt cx="6019800" cy="3127576"/>
+          </a:xfrm>
+        </p:grpSpPr>
+        <p:pic>
+          <p:nvPicPr>
+            <p:cNvPr id="9" name="Picture 8" descr="Table&#10;&#10;Description automatically generated">
+              <a:extLst>
+                <a:ext uri="{FF2B5EF4-FFF2-40B4-BE49-F238E27FC236}">
+                  <a16:creationId xmlns:a16="http://schemas.microsoft.com/office/drawing/2014/main" id="{5856CF3D-FE0A-4734-9B53-ABB541FF95BE}"/>
+                </a:ext>
+              </a:extLst>
+            </p:cNvPr>
+            <p:cNvPicPr>
+              <a:picLocks noChangeAspect="1"/>
+            </p:cNvPicPr>
+            <p:nvPr/>
+          </p:nvPicPr>
+          <p:blipFill>
+            <a:blip r:embed="rId3"/>
+            <a:stretch>
+              <a:fillRect/>
+            </a:stretch>
+          </p:blipFill>
+          <p:spPr>
+            <a:xfrm>
+              <a:off x="6140428" y="1568932"/>
+              <a:ext cx="6019800" cy="3127576"/>
+            </a:xfrm>
+            <a:prstGeom prst="rect">
+              <a:avLst/>
+            </a:prstGeom>
+          </p:spPr>
+        </p:pic>
+        <p:sp>
+          <p:nvSpPr>
+            <p:cNvPr id="8" name="Rectangle 7">
+              <a:extLst>
+                <a:ext uri="{FF2B5EF4-FFF2-40B4-BE49-F238E27FC236}">
+                  <a16:creationId xmlns:a16="http://schemas.microsoft.com/office/drawing/2014/main" id="{06D1D851-FBFF-609E-8C58-28E313B774E1}"/>
+                </a:ext>
+              </a:extLst>
+            </p:cNvPr>
+            <p:cNvSpPr/>
+            <p:nvPr/>
+          </p:nvSpPr>
+          <p:spPr>
+            <a:xfrm>
+              <a:off x="7809795" y="3873680"/>
+              <a:ext cx="4273061" cy="122738"/>
+            </a:xfrm>
+            <a:prstGeom prst="rect">
+              <a:avLst/>
+            </a:prstGeom>
+            <a:solidFill>
+              <a:srgbClr val="FFFF00">
+                <a:alpha val="34710"/>
+              </a:srgbClr>
+            </a:solidFill>
+            <a:ln>
+              <a:noFill/>
+            </a:ln>
+          </p:spPr>
+          <p:style>
+            <a:lnRef idx="2">
+              <a:schemeClr val="accent1">
+                <a:shade val="50000"/>
+              </a:schemeClr>
+            </a:lnRef>
+            <a:fillRef idx="1">
+              <a:schemeClr val="accent1"/>
+            </a:fillRef>
+            <a:effectRef idx="0">
+              <a:schemeClr val="accent1"/>
+            </a:effectRef>
+            <a:fontRef idx="minor">
+              <a:schemeClr val="lt1"/>
+            </a:fontRef>
+          </p:style>
+          <p:txBody>
+            <a:bodyPr rtlCol="0" anchor="ctr"/>
+            <a:lstStyle/>
+            <a:p>
+              <a:pPr algn="ctr"/>
+              <a:endParaRPr lang="en-US" dirty="0"/>
+            </a:p>
+          </p:txBody>
+        </p:sp>
+      </p:grpSp>
+      <p:sp>
+        <p:nvSpPr>
+          <p:cNvPr id="11" name="TextBox 10">
+            <a:extLst>
+              <a:ext uri="{FF2B5EF4-FFF2-40B4-BE49-F238E27FC236}">
+                <a16:creationId xmlns:a16="http://schemas.microsoft.com/office/drawing/2014/main" id="{473932C6-E016-CEE7-5FBD-8C010E13A57D}"/>
+              </a:ext>
+            </a:extLst>
+          </p:cNvPr>
+          <p:cNvSpPr txBox="1"/>
+          <p:nvPr/>
+        </p:nvSpPr>
         <p:spPr>
           <a:xfrm>
-            <a:off x="0" y="565150"/>
-            <a:ext cx="12192000" cy="6076950"/>
+            <a:off x="4205494" y="4139457"/>
+            <a:ext cx="3893655" cy="1477328"/>
           </a:xfrm>
           <a:prstGeom prst="rect">
             <a:avLst/>
           </a:prstGeom>
+          <a:noFill/>
         </p:spPr>
-      </p:pic>
+        <p:txBody>
+          <a:bodyPr wrap="square" rtlCol="0">
+            <a:spAutoFit/>
+          </a:bodyPr>
+          <a:lstStyle/>
+          <a:p>
+            <a:pPr algn="ctr"/>
+            <a:r>
+              <a:rPr lang="en-US" dirty="0"/>
+              <a:t>Rate increase of 34.25x. </a:t>
+            </a:r>
+          </a:p>
+          <a:p>
+            <a:pPr algn="ctr"/>
+            <a:r>
+              <a:rPr lang="en-US" dirty="0"/>
+              <a:t>Likely an error due to sample statistics.</a:t>
+            </a:r>
+          </a:p>
+          <a:p>
+            <a:pPr algn="ctr"/>
+            <a:endParaRPr lang="en-US" dirty="0"/>
+          </a:p>
+          <a:p>
+            <a:pPr algn="ctr"/>
+            <a:r>
+              <a:rPr lang="en-US" dirty="0"/>
+              <a:t>Side Note: We are now getting interactions with electrons.</a:t>
+            </a:r>
+          </a:p>
+        </p:txBody>
+      </p:sp>
+      <p:sp>
+        <p:nvSpPr>
+          <p:cNvPr id="12" name="Rectangle 11">
+            <a:extLst>
+              <a:ext uri="{FF2B5EF4-FFF2-40B4-BE49-F238E27FC236}">
+                <a16:creationId xmlns:a16="http://schemas.microsoft.com/office/drawing/2014/main" id="{1D940066-0F94-9F74-8E47-84D39BEE0121}"/>
+              </a:ext>
+            </a:extLst>
+          </p:cNvPr>
+          <p:cNvSpPr/>
+          <p:nvPr/>
+        </p:nvSpPr>
+        <p:spPr>
+          <a:xfrm>
+            <a:off x="0" y="6659808"/>
+            <a:ext cx="10078278" cy="198192"/>
+          </a:xfrm>
+          <a:prstGeom prst="rect">
+            <a:avLst/>
+          </a:prstGeom>
+          <a:solidFill>
+            <a:srgbClr val="0C4E97"/>
+          </a:solidFill>
+          <a:ln>
+            <a:noFill/>
+          </a:ln>
+        </p:spPr>
+        <p:style>
+          <a:lnRef idx="2">
+            <a:schemeClr val="accent1">
+              <a:shade val="50000"/>
+            </a:schemeClr>
+          </a:lnRef>
+          <a:fillRef idx="1">
+            <a:schemeClr val="accent1"/>
+          </a:fillRef>
+          <a:effectRef idx="0">
+            <a:schemeClr val="accent1"/>
+          </a:effectRef>
+          <a:fontRef idx="minor">
+            <a:schemeClr val="lt1"/>
+          </a:fontRef>
+        </p:style>
+        <p:txBody>
+          <a:bodyPr rtlCol="0" anchor="ctr"/>
+          <a:lstStyle/>
+          <a:p>
+            <a:r>
+              <a:rPr lang="en-US" sz="1600" dirty="0"/>
+              <a:t>South Dakota Mines</a:t>
+            </a:r>
+          </a:p>
+        </p:txBody>
+      </p:sp>
+      <p:sp>
+        <p:nvSpPr>
+          <p:cNvPr id="13" name="Rectangle 12">
+            <a:extLst>
+              <a:ext uri="{FF2B5EF4-FFF2-40B4-BE49-F238E27FC236}">
+                <a16:creationId xmlns:a16="http://schemas.microsoft.com/office/drawing/2014/main" id="{B98CD7BA-0E56-F210-E898-B95B742080F7}"/>
+              </a:ext>
+            </a:extLst>
+          </p:cNvPr>
+          <p:cNvSpPr/>
+          <p:nvPr/>
+        </p:nvSpPr>
+        <p:spPr>
+          <a:xfrm>
+            <a:off x="488945" y="1568803"/>
+            <a:ext cx="1043960" cy="120849"/>
+          </a:xfrm>
+          <a:prstGeom prst="rect">
+            <a:avLst/>
+          </a:prstGeom>
+          <a:solidFill>
+            <a:srgbClr val="FFFF00">
+              <a:alpha val="34710"/>
+            </a:srgbClr>
+          </a:solidFill>
+          <a:ln>
+            <a:noFill/>
+          </a:ln>
+        </p:spPr>
+        <p:style>
+          <a:lnRef idx="2">
+            <a:schemeClr val="accent1">
+              <a:shade val="50000"/>
+            </a:schemeClr>
+          </a:lnRef>
+          <a:fillRef idx="1">
+            <a:schemeClr val="accent1"/>
+          </a:fillRef>
+          <a:effectRef idx="0">
+            <a:schemeClr val="accent1"/>
+          </a:effectRef>
+          <a:fontRef idx="minor">
+            <a:schemeClr val="lt1"/>
+          </a:fontRef>
+        </p:style>
+        <p:txBody>
+          <a:bodyPr rtlCol="0" anchor="ctr"/>
+          <a:lstStyle/>
+          <a:p>
+            <a:pPr algn="ctr"/>
+            <a:endParaRPr lang="en-US" dirty="0"/>
+          </a:p>
+        </p:txBody>
+      </p:sp>
+      <p:sp>
+        <p:nvSpPr>
+          <p:cNvPr id="14" name="Rectangle 13">
+            <a:extLst>
+              <a:ext uri="{FF2B5EF4-FFF2-40B4-BE49-F238E27FC236}">
+                <a16:creationId xmlns:a16="http://schemas.microsoft.com/office/drawing/2014/main" id="{6BC6036F-5F63-01F1-E9A0-7622AA37E04A}"/>
+              </a:ext>
+            </a:extLst>
+          </p:cNvPr>
+          <p:cNvSpPr/>
+          <p:nvPr/>
+        </p:nvSpPr>
+        <p:spPr>
+          <a:xfrm>
+            <a:off x="6563741" y="1568805"/>
+            <a:ext cx="1123992" cy="120849"/>
+          </a:xfrm>
+          <a:prstGeom prst="rect">
+            <a:avLst/>
+          </a:prstGeom>
+          <a:solidFill>
+            <a:srgbClr val="FFFF00">
+              <a:alpha val="34710"/>
+            </a:srgbClr>
+          </a:solidFill>
+          <a:ln>
+            <a:noFill/>
+          </a:ln>
+        </p:spPr>
+        <p:style>
+          <a:lnRef idx="2">
+            <a:schemeClr val="accent1">
+              <a:shade val="50000"/>
+            </a:schemeClr>
+          </a:lnRef>
+          <a:fillRef idx="1">
+            <a:schemeClr val="accent1"/>
+          </a:fillRef>
+          <a:effectRef idx="0">
+            <a:schemeClr val="accent1"/>
+          </a:effectRef>
+          <a:fontRef idx="minor">
+            <a:schemeClr val="lt1"/>
+          </a:fontRef>
+        </p:style>
+        <p:txBody>
+          <a:bodyPr rtlCol="0" anchor="ctr"/>
+          <a:lstStyle/>
+          <a:p>
+            <a:pPr algn="ctr"/>
+            <a:endParaRPr lang="en-US" dirty="0"/>
+          </a:p>
+        </p:txBody>
+      </p:sp>
     </p:spTree>
     <p:extLst>
       <p:ext uri="{BB962C8B-B14F-4D97-AF65-F5344CB8AC3E}">
-        <p14:creationId xmlns:p14="http://schemas.microsoft.com/office/powerpoint/2010/main" val="1799966639"/>
+        <p14:creationId xmlns:p14="http://schemas.microsoft.com/office/powerpoint/2010/main" val="677230222"/>
       </p:ext>
     </p:extLst>
   </p:cSld>

</xml_diff>